<commit_message>
fixed title of lagoon permits and created new w2w slides - for scheduling details
</commit_message>
<xml_diff>
--- a/ActiveNet Trainer/PowerPoint Creations/Lagoon Permits.pptx
+++ b/ActiveNet Trainer/PowerPoint Creations/Lagoon Permits.pptx
@@ -3064,8 +3064,8 @@
           <a:p>
             <a:pPr algn="ctr"/>
             <a:r>
-              <a:rPr lang="en-US" sz="3200" dirty="0" smtClean="0"/>
-              <a:t>Before We Continue</a:t>
+              <a:rPr lang="en-US" sz="3200" smtClean="0"/>
+              <a:t>Lagoon Permits</a:t>
             </a:r>
             <a:endParaRPr lang="en-US" sz="3200" dirty="0"/>
           </a:p>

</xml_diff>